<commit_message>
Adicionando remotamente do git bash
</commit_message>
<xml_diff>
--- a/Atalhos img.pptx
+++ b/Atalhos img.pptx
@@ -8,6 +8,7 @@
     <p:sldId id="256" r:id="rId2"/>
     <p:sldId id="257" r:id="rId3"/>
     <p:sldId id="258" r:id="rId4"/>
+    <p:sldId id="259" r:id="rId5"/>
   </p:sldIdLst>
   <p:sldSz cx="12192000" cy="6858000"/>
   <p:notesSz cx="6858000" cy="9144000"/>
@@ -245,7 +246,7 @@
           <a:p>
             <a:fld id="{D7EF89F4-677A-454A-B8BB-E8AE75CC721B}" type="datetimeFigureOut">
               <a:rPr lang="pt-BR" smtClean="0"/>
-              <a:t>10/05/2022</a:t>
+              <a:t>13/05/2022</a:t>
             </a:fld>
             <a:endParaRPr lang="pt-BR"/>
           </a:p>
@@ -415,7 +416,7 @@
           <a:p>
             <a:fld id="{D7EF89F4-677A-454A-B8BB-E8AE75CC721B}" type="datetimeFigureOut">
               <a:rPr lang="pt-BR" smtClean="0"/>
-              <a:t>10/05/2022</a:t>
+              <a:t>13/05/2022</a:t>
             </a:fld>
             <a:endParaRPr lang="pt-BR"/>
           </a:p>
@@ -595,7 +596,7 @@
           <a:p>
             <a:fld id="{D7EF89F4-677A-454A-B8BB-E8AE75CC721B}" type="datetimeFigureOut">
               <a:rPr lang="pt-BR" smtClean="0"/>
-              <a:t>10/05/2022</a:t>
+              <a:t>13/05/2022</a:t>
             </a:fld>
             <a:endParaRPr lang="pt-BR"/>
           </a:p>
@@ -765,7 +766,7 @@
           <a:p>
             <a:fld id="{D7EF89F4-677A-454A-B8BB-E8AE75CC721B}" type="datetimeFigureOut">
               <a:rPr lang="pt-BR" smtClean="0"/>
-              <a:t>10/05/2022</a:t>
+              <a:t>13/05/2022</a:t>
             </a:fld>
             <a:endParaRPr lang="pt-BR"/>
           </a:p>
@@ -1011,7 +1012,7 @@
           <a:p>
             <a:fld id="{D7EF89F4-677A-454A-B8BB-E8AE75CC721B}" type="datetimeFigureOut">
               <a:rPr lang="pt-BR" smtClean="0"/>
-              <a:t>10/05/2022</a:t>
+              <a:t>13/05/2022</a:t>
             </a:fld>
             <a:endParaRPr lang="pt-BR"/>
           </a:p>
@@ -1243,7 +1244,7 @@
           <a:p>
             <a:fld id="{D7EF89F4-677A-454A-B8BB-E8AE75CC721B}" type="datetimeFigureOut">
               <a:rPr lang="pt-BR" smtClean="0"/>
-              <a:t>10/05/2022</a:t>
+              <a:t>13/05/2022</a:t>
             </a:fld>
             <a:endParaRPr lang="pt-BR"/>
           </a:p>
@@ -1610,7 +1611,7 @@
           <a:p>
             <a:fld id="{D7EF89F4-677A-454A-B8BB-E8AE75CC721B}" type="datetimeFigureOut">
               <a:rPr lang="pt-BR" smtClean="0"/>
-              <a:t>10/05/2022</a:t>
+              <a:t>13/05/2022</a:t>
             </a:fld>
             <a:endParaRPr lang="pt-BR"/>
           </a:p>
@@ -1728,7 +1729,7 @@
           <a:p>
             <a:fld id="{D7EF89F4-677A-454A-B8BB-E8AE75CC721B}" type="datetimeFigureOut">
               <a:rPr lang="pt-BR" smtClean="0"/>
-              <a:t>10/05/2022</a:t>
+              <a:t>13/05/2022</a:t>
             </a:fld>
             <a:endParaRPr lang="pt-BR"/>
           </a:p>
@@ -1823,7 +1824,7 @@
           <a:p>
             <a:fld id="{D7EF89F4-677A-454A-B8BB-E8AE75CC721B}" type="datetimeFigureOut">
               <a:rPr lang="pt-BR" smtClean="0"/>
-              <a:t>10/05/2022</a:t>
+              <a:t>13/05/2022</a:t>
             </a:fld>
             <a:endParaRPr lang="pt-BR"/>
           </a:p>
@@ -2100,7 +2101,7 @@
           <a:p>
             <a:fld id="{D7EF89F4-677A-454A-B8BB-E8AE75CC721B}" type="datetimeFigureOut">
               <a:rPr lang="pt-BR" smtClean="0"/>
-              <a:t>10/05/2022</a:t>
+              <a:t>13/05/2022</a:t>
             </a:fld>
             <a:endParaRPr lang="pt-BR"/>
           </a:p>
@@ -2353,7 +2354,7 @@
           <a:p>
             <a:fld id="{D7EF89F4-677A-454A-B8BB-E8AE75CC721B}" type="datetimeFigureOut">
               <a:rPr lang="pt-BR" smtClean="0"/>
-              <a:t>10/05/2022</a:t>
+              <a:t>13/05/2022</a:t>
             </a:fld>
             <a:endParaRPr lang="pt-BR"/>
           </a:p>
@@ -2566,7 +2567,7 @@
           <a:p>
             <a:fld id="{D7EF89F4-677A-454A-B8BB-E8AE75CC721B}" type="datetimeFigureOut">
               <a:rPr lang="pt-BR" smtClean="0"/>
-              <a:t>10/05/2022</a:t>
+              <a:t>13/05/2022</a:t>
             </a:fld>
             <a:endParaRPr lang="pt-BR"/>
           </a:p>
@@ -3148,7 +3149,6 @@
               <a:rPr lang="pt-BR" sz="1200" dirty="0" smtClean="0"/>
               <a:t>)</a:t>
             </a:r>
-            <a:endParaRPr lang="pt-BR" sz="1200" dirty="0" smtClean="0"/>
           </a:p>
           <a:p>
             <a:endParaRPr lang="pt-BR" sz="1200" dirty="0" smtClean="0"/>
@@ -5002,6 +5002,658 @@
     <p:extLst>
       <p:ext uri="{BB962C8B-B14F-4D97-AF65-F5344CB8AC3E}">
         <p14:creationId xmlns:p14="http://schemas.microsoft.com/office/powerpoint/2010/main" val="2472474100"/>
+      </p:ext>
+    </p:extLst>
+  </p:cSld>
+  <p:clrMapOvr>
+    <a:masterClrMapping/>
+  </p:clrMapOvr>
+  <p:timing>
+    <p:tnLst>
+      <p:par>
+        <p:cTn id="1" dur="indefinite" restart="never" nodeType="tmRoot"/>
+      </p:par>
+    </p:tnLst>
+  </p:timing>
+</p:sld>
+</file>
+
+<file path=ppt/slides/slide4.xml><?xml version="1.0" encoding="utf-8"?>
+<p:sld xmlns:a="http://schemas.openxmlformats.org/drawingml/2006/main" xmlns:r="http://schemas.openxmlformats.org/officeDocument/2006/relationships" xmlns:p="http://schemas.openxmlformats.org/presentationml/2006/main">
+  <p:cSld>
+    <p:spTree>
+      <p:nvGrpSpPr>
+        <p:cNvPr id="1" name=""/>
+        <p:cNvGrpSpPr/>
+        <p:nvPr/>
+      </p:nvGrpSpPr>
+      <p:grpSpPr>
+        <a:xfrm>
+          <a:off x="0" y="0"/>
+          <a:ext cx="0" cy="0"/>
+          <a:chOff x="0" y="0"/>
+          <a:chExt cx="0" cy="0"/>
+        </a:xfrm>
+      </p:grpSpPr>
+      <p:sp>
+        <p:nvSpPr>
+          <p:cNvPr id="2" name="Retângulo 1"/>
+          <p:cNvSpPr/>
+          <p:nvPr/>
+        </p:nvSpPr>
+        <p:spPr>
+          <a:xfrm>
+            <a:off x="336859" y="796333"/>
+            <a:ext cx="7664141" cy="2246769"/>
+          </a:xfrm>
+          <a:prstGeom prst="rect">
+            <a:avLst/>
+          </a:prstGeom>
+        </p:spPr>
+        <p:txBody>
+          <a:bodyPr wrap="square">
+            <a:spAutoFit/>
+          </a:bodyPr>
+          <a:lstStyle/>
+          <a:p>
+            <a:pPr marL="285750" indent="-285750">
+              <a:buFont typeface="Arial" panose="020B0604020202020204" pitchFamily="34" charset="0"/>
+              <a:buChar char="•"/>
+            </a:pPr>
+            <a:r>
+              <a:rPr lang="pt-BR" sz="1400" b="1" u="sng" dirty="0" smtClean="0">
+                <a:effectLst>
+                  <a:outerShdw blurRad="38100" dist="38100" dir="2700000" algn="tl">
+                    <a:srgbClr val="000000">
+                      <a:alpha val="43137"/>
+                    </a:srgbClr>
+                  </a:outerShdw>
+                </a:effectLst>
+              </a:rPr>
+              <a:t>Criando uma nova pasta de onde eu </a:t>
+            </a:r>
+            <a:r>
+              <a:rPr lang="pt-BR" sz="1400" b="1" u="sng" dirty="0" err="1" smtClean="0">
+                <a:effectLst>
+                  <a:outerShdw blurRad="38100" dist="38100" dir="2700000" algn="tl">
+                    <a:srgbClr val="000000">
+                      <a:alpha val="43137"/>
+                    </a:srgbClr>
+                  </a:outerShdw>
+                </a:effectLst>
+              </a:rPr>
+              <a:t>tava</a:t>
+            </a:r>
+            <a:endParaRPr lang="pt-BR" sz="1400" b="1" u="sng" dirty="0" smtClean="0">
+              <a:effectLst>
+                <a:outerShdw blurRad="38100" dist="38100" dir="2700000" algn="tl">
+                  <a:srgbClr val="000000">
+                    <a:alpha val="43137"/>
+                  </a:srgbClr>
+                </a:outerShdw>
+              </a:effectLst>
+            </a:endParaRPr>
+          </a:p>
+          <a:p>
+            <a:r>
+              <a:rPr lang="pt-BR" sz="1400" dirty="0" smtClean="0">
+                <a:effectLst>
+                  <a:outerShdw blurRad="38100" dist="38100" dir="2700000" algn="tl">
+                    <a:srgbClr val="000000">
+                      <a:alpha val="43137"/>
+                    </a:srgbClr>
+                  </a:outerShdw>
+                </a:effectLst>
+              </a:rPr>
+              <a:t>Voltar uma pasta = </a:t>
+            </a:r>
+            <a:r>
+              <a:rPr lang="pt-BR" sz="1400" dirty="0" err="1" smtClean="0">
+                <a:effectLst>
+                  <a:outerShdw blurRad="38100" dist="38100" dir="2700000" algn="tl">
+                    <a:srgbClr val="000000">
+                      <a:alpha val="43137"/>
+                    </a:srgbClr>
+                  </a:outerShdw>
+                </a:effectLst>
+              </a:rPr>
+              <a:t>cd</a:t>
+            </a:r>
+            <a:r>
+              <a:rPr lang="pt-BR" sz="1400" dirty="0" smtClean="0">
+                <a:effectLst>
+                  <a:outerShdw blurRad="38100" dist="38100" dir="2700000" algn="tl">
+                    <a:srgbClr val="000000">
+                      <a:alpha val="43137"/>
+                    </a:srgbClr>
+                  </a:outerShdw>
+                </a:effectLst>
+              </a:rPr>
+              <a:t> ..</a:t>
+            </a:r>
+          </a:p>
+          <a:p>
+            <a:r>
+              <a:rPr lang="pt-BR" sz="1400" dirty="0" smtClean="0">
+                <a:effectLst>
+                  <a:outerShdw blurRad="38100" dist="38100" dir="2700000" algn="tl">
+                    <a:srgbClr val="000000">
+                      <a:alpha val="43137"/>
+                    </a:srgbClr>
+                  </a:outerShdw>
+                </a:effectLst>
+              </a:rPr>
+              <a:t>Criar a pasta da Ana = </a:t>
+            </a:r>
+            <a:r>
+              <a:rPr lang="pt-BR" sz="1400" dirty="0" err="1" smtClean="0">
+                <a:effectLst>
+                  <a:outerShdw blurRad="38100" dist="38100" dir="2700000" algn="tl">
+                    <a:srgbClr val="000000">
+                      <a:alpha val="43137"/>
+                    </a:srgbClr>
+                  </a:outerShdw>
+                </a:effectLst>
+              </a:rPr>
+              <a:t>mkdir</a:t>
+            </a:r>
+            <a:r>
+              <a:rPr lang="pt-BR" sz="1400" dirty="0" smtClean="0">
+                <a:effectLst>
+                  <a:outerShdw blurRad="38100" dist="38100" dir="2700000" algn="tl">
+                    <a:srgbClr val="000000">
+                      <a:alpha val="43137"/>
+                    </a:srgbClr>
+                  </a:outerShdw>
+                </a:effectLst>
+              </a:rPr>
+              <a:t> </a:t>
+            </a:r>
+            <a:r>
+              <a:rPr lang="pt-BR" sz="1400" dirty="0" err="1" smtClean="0">
+                <a:effectLst>
+                  <a:outerShdw blurRad="38100" dist="38100" dir="2700000" algn="tl">
+                    <a:srgbClr val="000000">
+                      <a:alpha val="43137"/>
+                    </a:srgbClr>
+                  </a:outerShdw>
+                </a:effectLst>
+              </a:rPr>
+              <a:t>ana</a:t>
+            </a:r>
+            <a:endParaRPr lang="pt-BR" sz="1400" dirty="0" smtClean="0">
+              <a:effectLst>
+                <a:outerShdw blurRad="38100" dist="38100" dir="2700000" algn="tl">
+                  <a:srgbClr val="000000">
+                    <a:alpha val="43137"/>
+                  </a:srgbClr>
+                </a:outerShdw>
+              </a:effectLst>
+            </a:endParaRPr>
+          </a:p>
+          <a:p>
+            <a:r>
+              <a:rPr lang="pt-BR" sz="1400" dirty="0" smtClean="0"/>
+              <a:t>Entrar na pasta = </a:t>
+            </a:r>
+            <a:r>
+              <a:rPr lang="pt-BR" sz="1400" dirty="0" err="1" smtClean="0"/>
+              <a:t>cd</a:t>
+            </a:r>
+            <a:r>
+              <a:rPr lang="pt-BR" sz="1400" dirty="0" smtClean="0"/>
+              <a:t> </a:t>
+            </a:r>
+            <a:r>
+              <a:rPr lang="pt-BR" sz="1400" dirty="0" err="1" smtClean="0"/>
+              <a:t>ana</a:t>
+            </a:r>
+            <a:r>
+              <a:rPr lang="pt-BR" sz="1400" dirty="0"/>
+              <a:t> </a:t>
+            </a:r>
+            <a:r>
+              <a:rPr lang="pt-BR" sz="1400" dirty="0" smtClean="0"/>
+              <a:t>(simbolizando o computador da </a:t>
+            </a:r>
+            <a:r>
+              <a:rPr lang="pt-BR" sz="1400" dirty="0" err="1" smtClean="0"/>
+              <a:t>ana</a:t>
+            </a:r>
+            <a:r>
+              <a:rPr lang="pt-BR" sz="1400" dirty="0" smtClean="0"/>
+              <a:t>)</a:t>
+            </a:r>
+          </a:p>
+          <a:p>
+            <a:r>
+              <a:rPr lang="pt-BR" sz="1400" dirty="0"/>
+              <a:t>	</a:t>
+            </a:r>
+            <a:r>
+              <a:rPr lang="pt-BR" sz="1400" dirty="0" smtClean="0"/>
+              <a:t>Agora ela vai clonar, pela primeira vez o servidor no </a:t>
+            </a:r>
+            <a:r>
+              <a:rPr lang="pt-BR" sz="1400" dirty="0" err="1" smtClean="0"/>
+              <a:t>pc</a:t>
+            </a:r>
+            <a:r>
+              <a:rPr lang="pt-BR" sz="1400" dirty="0" smtClean="0"/>
+              <a:t> dela</a:t>
+            </a:r>
+          </a:p>
+          <a:p>
+            <a:r>
+              <a:rPr lang="pt-BR" sz="1400" dirty="0" smtClean="0"/>
+              <a:t>Clonagem e </a:t>
+            </a:r>
+            <a:r>
+              <a:rPr lang="pt-BR" sz="1400" b="1" i="1" dirty="0" smtClean="0"/>
+              <a:t>nome da pasta</a:t>
+            </a:r>
+            <a:r>
+              <a:rPr lang="pt-BR" sz="1400" dirty="0" smtClean="0"/>
+              <a:t> = </a:t>
+            </a:r>
+            <a:r>
+              <a:rPr lang="pt-BR" sz="1400" dirty="0" err="1" smtClean="0"/>
+              <a:t>git</a:t>
+            </a:r>
+            <a:r>
+              <a:rPr lang="pt-BR" sz="1400" dirty="0" smtClean="0"/>
+              <a:t> clone “(endereço do servidor, </a:t>
+            </a:r>
+            <a:r>
+              <a:rPr lang="pt-BR" sz="1400" dirty="0"/>
+              <a:t>no caso D:\Yuri\01 </a:t>
+            </a:r>
+            <a:r>
+              <a:rPr lang="pt-BR" sz="1400" dirty="0" err="1"/>
+              <a:t>Alura</a:t>
+            </a:r>
+            <a:r>
+              <a:rPr lang="pt-BR" sz="1400" dirty="0"/>
+              <a:t>\17 </a:t>
+            </a:r>
+            <a:r>
+              <a:rPr lang="pt-BR" sz="1400" dirty="0" err="1" smtClean="0"/>
+              <a:t>Git</a:t>
+            </a:r>
+            <a:r>
+              <a:rPr lang="pt-BR" sz="1400" dirty="0" smtClean="0"/>
+              <a:t>\servidor)” </a:t>
+            </a:r>
+            <a:r>
+              <a:rPr lang="pt-BR" sz="1400" b="1" i="1" dirty="0" smtClean="0"/>
+              <a:t>projeto</a:t>
+            </a:r>
+          </a:p>
+          <a:p>
+            <a:r>
+              <a:rPr lang="pt-BR" sz="1400" dirty="0"/>
+              <a:t>	</a:t>
+            </a:r>
+            <a:r>
+              <a:rPr lang="pt-BR" sz="1400" dirty="0" smtClean="0"/>
+              <a:t>Ele diz que está clonando um repositório vazio, justamente pois nenhum dado foi enviado</a:t>
+            </a:r>
+            <a:endParaRPr lang="pt-BR" sz="1400" dirty="0"/>
+          </a:p>
+          <a:p>
+            <a:endParaRPr lang="pt-BR" sz="1400" dirty="0"/>
+          </a:p>
+          <a:p>
+            <a:endParaRPr lang="pt-BR" sz="1400" dirty="0" smtClean="0"/>
+          </a:p>
+        </p:txBody>
+      </p:sp>
+      <p:sp>
+        <p:nvSpPr>
+          <p:cNvPr id="8" name="CaixaDeTexto 7"/>
+          <p:cNvSpPr txBox="1"/>
+          <p:nvPr/>
+        </p:nvSpPr>
+        <p:spPr>
+          <a:xfrm>
+            <a:off x="3257060" y="150002"/>
+            <a:ext cx="8934940" cy="646331"/>
+          </a:xfrm>
+          <a:prstGeom prst="rect">
+            <a:avLst/>
+          </a:prstGeom>
+          <a:noFill/>
+        </p:spPr>
+        <p:txBody>
+          <a:bodyPr wrap="square" rtlCol="0">
+            <a:spAutoFit/>
+          </a:bodyPr>
+          <a:lstStyle/>
+          <a:p>
+            <a:r>
+              <a:rPr lang="pt-BR" sz="3600" dirty="0" smtClean="0">
+                <a:solidFill>
+                  <a:srgbClr val="7030A0"/>
+                </a:solidFill>
+              </a:rPr>
+              <a:t>Pegando dados do servidor pela primeira vez </a:t>
+            </a:r>
+            <a:endParaRPr lang="pt-BR" sz="3600" dirty="0">
+              <a:solidFill>
+                <a:srgbClr val="7030A0"/>
+              </a:solidFill>
+            </a:endParaRPr>
+          </a:p>
+        </p:txBody>
+      </p:sp>
+      <p:pic>
+        <p:nvPicPr>
+          <p:cNvPr id="3" name="Imagem 2"/>
+          <p:cNvPicPr>
+            <a:picLocks noChangeAspect="1"/>
+          </p:cNvPicPr>
+          <p:nvPr/>
+        </p:nvPicPr>
+        <p:blipFill>
+          <a:blip r:embed="rId2"/>
+          <a:stretch>
+            <a:fillRect/>
+          </a:stretch>
+        </p:blipFill>
+        <p:spPr>
+          <a:xfrm>
+            <a:off x="7503459" y="919159"/>
+            <a:ext cx="4243120" cy="1222820"/>
+          </a:xfrm>
+          <a:prstGeom prst="rect">
+            <a:avLst/>
+          </a:prstGeom>
+        </p:spPr>
+      </p:pic>
+      <p:sp>
+        <p:nvSpPr>
+          <p:cNvPr id="5" name="Retângulo 4"/>
+          <p:cNvSpPr/>
+          <p:nvPr/>
+        </p:nvSpPr>
+        <p:spPr>
+          <a:xfrm>
+            <a:off x="336858" y="3384202"/>
+            <a:ext cx="7664141" cy="2246769"/>
+          </a:xfrm>
+          <a:prstGeom prst="rect">
+            <a:avLst/>
+          </a:prstGeom>
+        </p:spPr>
+        <p:txBody>
+          <a:bodyPr wrap="square">
+            <a:spAutoFit/>
+          </a:bodyPr>
+          <a:lstStyle/>
+          <a:p>
+            <a:pPr marL="285750" indent="-285750">
+              <a:buFont typeface="Arial" panose="020B0604020202020204" pitchFamily="34" charset="0"/>
+              <a:buChar char="•"/>
+            </a:pPr>
+            <a:r>
+              <a:rPr lang="pt-BR" sz="1400" b="1" u="sng" dirty="0" smtClean="0">
+                <a:effectLst>
+                  <a:outerShdw blurRad="38100" dist="38100" dir="2700000" algn="tl">
+                    <a:srgbClr val="000000">
+                      <a:alpha val="43137"/>
+                    </a:srgbClr>
+                  </a:outerShdw>
+                </a:effectLst>
+              </a:rPr>
+              <a:t>Upload pro servidor</a:t>
+            </a:r>
+            <a:endParaRPr lang="pt-BR" sz="1400" b="1" u="sng" dirty="0" smtClean="0">
+              <a:effectLst>
+                <a:outerShdw blurRad="38100" dist="38100" dir="2700000" algn="tl">
+                  <a:srgbClr val="000000">
+                    <a:alpha val="43137"/>
+                  </a:srgbClr>
+                </a:outerShdw>
+              </a:effectLst>
+            </a:endParaRPr>
+          </a:p>
+          <a:p>
+            <a:r>
+              <a:rPr lang="pt-BR" sz="1400" dirty="0" smtClean="0">
+                <a:effectLst>
+                  <a:outerShdw blurRad="38100" dist="38100" dir="2700000" algn="tl">
+                    <a:srgbClr val="000000">
+                      <a:alpha val="43137"/>
+                    </a:srgbClr>
+                  </a:outerShdw>
+                </a:effectLst>
+              </a:rPr>
+              <a:t>Pegar o link dado pelo </a:t>
+            </a:r>
+            <a:r>
+              <a:rPr lang="pt-BR" sz="1400" dirty="0" err="1" smtClean="0">
+                <a:effectLst>
+                  <a:outerShdw blurRad="38100" dist="38100" dir="2700000" algn="tl">
+                    <a:srgbClr val="000000">
+                      <a:alpha val="43137"/>
+                    </a:srgbClr>
+                  </a:outerShdw>
+                </a:effectLst>
+              </a:rPr>
+              <a:t>github.Ex</a:t>
+            </a:r>
+            <a:r>
+              <a:rPr lang="pt-BR" sz="1400" dirty="0" smtClean="0">
+                <a:effectLst>
+                  <a:outerShdw blurRad="38100" dist="38100" dir="2700000" algn="tl">
+                    <a:srgbClr val="000000">
+                      <a:alpha val="43137"/>
+                    </a:srgbClr>
+                  </a:outerShdw>
+                </a:effectLst>
+              </a:rPr>
+              <a:t>: </a:t>
+            </a:r>
+            <a:r>
+              <a:rPr lang="pt-BR" sz="1400" dirty="0">
+                <a:effectLst>
+                  <a:outerShdw blurRad="38100" dist="38100" dir="2700000" algn="tl">
+                    <a:srgbClr val="000000">
+                      <a:alpha val="43137"/>
+                    </a:srgbClr>
+                  </a:outerShdw>
+                </a:effectLst>
+                <a:hlinkClick r:id="rId3"/>
+              </a:rPr>
+              <a:t>https://</a:t>
+            </a:r>
+            <a:r>
+              <a:rPr lang="pt-BR" sz="1400" dirty="0" smtClean="0">
+                <a:effectLst>
+                  <a:outerShdw blurRad="38100" dist="38100" dir="2700000" algn="tl">
+                    <a:srgbClr val="000000">
+                      <a:alpha val="43137"/>
+                    </a:srgbClr>
+                  </a:outerShdw>
+                </a:effectLst>
+                <a:hlinkClick r:id="rId3"/>
+              </a:rPr>
+              <a:t>github.com/YuriCF1/ToDoList.git</a:t>
+            </a:r>
+            <a:r>
+              <a:rPr lang="pt-BR" sz="1400" dirty="0" smtClean="0">
+                <a:effectLst>
+                  <a:outerShdw blurRad="38100" dist="38100" dir="2700000" algn="tl">
+                    <a:srgbClr val="000000">
+                      <a:alpha val="43137"/>
+                    </a:srgbClr>
+                  </a:outerShdw>
+                </a:effectLst>
+              </a:rPr>
+              <a:t>  (não se esqueça do .</a:t>
+            </a:r>
+            <a:r>
+              <a:rPr lang="pt-BR" sz="1400" dirty="0" err="1" smtClean="0">
+                <a:effectLst>
+                  <a:outerShdw blurRad="38100" dist="38100" dir="2700000" algn="tl">
+                    <a:srgbClr val="000000">
+                      <a:alpha val="43137"/>
+                    </a:srgbClr>
+                  </a:outerShdw>
+                </a:effectLst>
+              </a:rPr>
+              <a:t>git</a:t>
+            </a:r>
+            <a:r>
+              <a:rPr lang="pt-BR" sz="1400" dirty="0" smtClean="0">
+                <a:effectLst>
+                  <a:outerShdw blurRad="38100" dist="38100" dir="2700000" algn="tl">
+                    <a:srgbClr val="000000">
+                      <a:alpha val="43137"/>
+                    </a:srgbClr>
+                  </a:outerShdw>
+                </a:effectLst>
+              </a:rPr>
+              <a:t> no final)</a:t>
+            </a:r>
+          </a:p>
+          <a:p>
+            <a:endParaRPr lang="pt-BR" sz="1400" dirty="0"/>
+          </a:p>
+          <a:p>
+            <a:r>
+              <a:rPr lang="pt-BR" sz="1400" dirty="0" smtClean="0"/>
+              <a:t>Para enviar: </a:t>
+            </a:r>
+            <a:r>
+              <a:rPr lang="pt-BR" sz="1400" dirty="0" err="1" smtClean="0"/>
+              <a:t>git</a:t>
+            </a:r>
+            <a:r>
+              <a:rPr lang="pt-BR" sz="1400" dirty="0" smtClean="0"/>
+              <a:t> </a:t>
+            </a:r>
+            <a:r>
+              <a:rPr lang="pt-BR" sz="1400" dirty="0" err="1" smtClean="0"/>
+              <a:t>push</a:t>
+            </a:r>
+            <a:r>
+              <a:rPr lang="pt-BR" sz="1400" dirty="0" smtClean="0"/>
+              <a:t> –u </a:t>
+            </a:r>
+            <a:r>
+              <a:rPr lang="pt-BR" sz="1400" dirty="0" err="1" smtClean="0"/>
+              <a:t>origin</a:t>
+            </a:r>
+            <a:r>
+              <a:rPr lang="pt-BR" sz="1400" dirty="0" smtClean="0"/>
+              <a:t> máster </a:t>
+            </a:r>
+          </a:p>
+          <a:p>
+            <a:r>
+              <a:rPr lang="pt-BR" sz="1400" dirty="0" err="1" smtClean="0"/>
+              <a:t>Origin</a:t>
+            </a:r>
+            <a:r>
+              <a:rPr lang="pt-BR" sz="1400" dirty="0" smtClean="0"/>
+              <a:t> = nome padrão do repositório no </a:t>
+            </a:r>
+            <a:r>
+              <a:rPr lang="pt-BR" sz="1400" dirty="0" err="1" smtClean="0"/>
+              <a:t>github</a:t>
+            </a:r>
+            <a:endParaRPr lang="pt-BR" sz="1400" dirty="0"/>
+          </a:p>
+          <a:p>
+            <a:r>
+              <a:rPr lang="pt-BR" sz="1400" dirty="0" smtClean="0"/>
+              <a:t>-u = Toda vez que </a:t>
+            </a:r>
+            <a:r>
+              <a:rPr lang="pt-BR" sz="1400" dirty="0" err="1" smtClean="0"/>
+              <a:t>vc</a:t>
+            </a:r>
+            <a:r>
+              <a:rPr lang="pt-BR" sz="1400" dirty="0" smtClean="0"/>
+              <a:t> digitar ‘</a:t>
+            </a:r>
+            <a:r>
+              <a:rPr lang="pt-BR" sz="1400" dirty="0" err="1" smtClean="0"/>
+              <a:t>git</a:t>
+            </a:r>
+            <a:r>
+              <a:rPr lang="pt-BR" sz="1400" dirty="0" smtClean="0"/>
+              <a:t> </a:t>
+            </a:r>
+            <a:r>
+              <a:rPr lang="pt-BR" sz="1400" dirty="0" err="1" smtClean="0"/>
+              <a:t>push</a:t>
+            </a:r>
+            <a:r>
+              <a:rPr lang="pt-BR" sz="1400" dirty="0" smtClean="0"/>
+              <a:t>’ e tiver no ‘máster’, irá mandar para o </a:t>
+            </a:r>
+            <a:r>
+              <a:rPr lang="pt-BR" sz="1400" dirty="0" err="1" smtClean="0"/>
+              <a:t>origin</a:t>
+            </a:r>
+            <a:endParaRPr lang="pt-BR" sz="1400" dirty="0" smtClean="0"/>
+          </a:p>
+          <a:p>
+            <a:r>
+              <a:rPr lang="pt-BR" sz="1400" dirty="0" smtClean="0"/>
+              <a:t>RECOMENDADO = Sempre dizer o repositório e a </a:t>
+            </a:r>
+            <a:r>
+              <a:rPr lang="pt-BR" sz="1400" dirty="0" err="1" smtClean="0"/>
+              <a:t>brand</a:t>
+            </a:r>
+            <a:r>
+              <a:rPr lang="pt-BR" sz="1400" dirty="0" smtClean="0"/>
+              <a:t> que eu queira mandar. Então tira o ‘–u’</a:t>
+            </a:r>
+          </a:p>
+          <a:p>
+            <a:endParaRPr lang="pt-BR" sz="1400" dirty="0"/>
+          </a:p>
+          <a:p>
+            <a:r>
+              <a:rPr lang="pt-BR" sz="1400" dirty="0" err="1" smtClean="0"/>
+              <a:t>git</a:t>
+            </a:r>
+            <a:r>
+              <a:rPr lang="pt-BR" sz="1400" dirty="0" smtClean="0"/>
+              <a:t> </a:t>
+            </a:r>
+            <a:r>
+              <a:rPr lang="pt-BR" sz="1400" dirty="0" err="1" smtClean="0"/>
+              <a:t>push</a:t>
+            </a:r>
+            <a:r>
+              <a:rPr lang="pt-BR" sz="1400" dirty="0" smtClean="0"/>
+              <a:t> </a:t>
+            </a:r>
+            <a:r>
+              <a:rPr lang="pt-BR" sz="1400" dirty="0" err="1" smtClean="0"/>
+              <a:t>origin</a:t>
+            </a:r>
+            <a:r>
+              <a:rPr lang="pt-BR" sz="1400" dirty="0" smtClean="0"/>
+              <a:t> </a:t>
+            </a:r>
+            <a:r>
+              <a:rPr lang="pt-BR" sz="1400" dirty="0" err="1" smtClean="0"/>
+              <a:t>master</a:t>
+            </a:r>
+            <a:endParaRPr lang="pt-BR" sz="1400" dirty="0" smtClean="0"/>
+          </a:p>
+        </p:txBody>
+      </p:sp>
+    </p:spTree>
+    <p:extLst>
+      <p:ext uri="{BB962C8B-B14F-4D97-AF65-F5344CB8AC3E}">
+        <p14:creationId xmlns:p14="http://schemas.microsoft.com/office/powerpoint/2010/main" val="3135698888"/>
       </p:ext>
     </p:extLst>
   </p:cSld>

</xml_diff>

<commit_message>
Adicionado curso e página no PP
</commit_message>
<xml_diff>
--- a/Atalhos img.pptx
+++ b/Atalhos img.pptx
@@ -8,6 +8,7 @@
     <p:sldId id="256" r:id="rId2"/>
     <p:sldId id="257" r:id="rId3"/>
     <p:sldId id="258" r:id="rId4"/>
+    <p:sldId id="259" r:id="rId5"/>
   </p:sldIdLst>
   <p:sldSz cx="12192000" cy="6858000"/>
   <p:notesSz cx="6858000" cy="9144000"/>
@@ -245,7 +246,7 @@
           <a:p>
             <a:fld id="{D7EF89F4-677A-454A-B8BB-E8AE75CC721B}" type="datetimeFigureOut">
               <a:rPr lang="pt-BR" smtClean="0"/>
-              <a:t>10/05/2022</a:t>
+              <a:t>22/05/2022</a:t>
             </a:fld>
             <a:endParaRPr lang="pt-BR"/>
           </a:p>
@@ -415,7 +416,7 @@
           <a:p>
             <a:fld id="{D7EF89F4-677A-454A-B8BB-E8AE75CC721B}" type="datetimeFigureOut">
               <a:rPr lang="pt-BR" smtClean="0"/>
-              <a:t>10/05/2022</a:t>
+              <a:t>22/05/2022</a:t>
             </a:fld>
             <a:endParaRPr lang="pt-BR"/>
           </a:p>
@@ -595,7 +596,7 @@
           <a:p>
             <a:fld id="{D7EF89F4-677A-454A-B8BB-E8AE75CC721B}" type="datetimeFigureOut">
               <a:rPr lang="pt-BR" smtClean="0"/>
-              <a:t>10/05/2022</a:t>
+              <a:t>22/05/2022</a:t>
             </a:fld>
             <a:endParaRPr lang="pt-BR"/>
           </a:p>
@@ -765,7 +766,7 @@
           <a:p>
             <a:fld id="{D7EF89F4-677A-454A-B8BB-E8AE75CC721B}" type="datetimeFigureOut">
               <a:rPr lang="pt-BR" smtClean="0"/>
-              <a:t>10/05/2022</a:t>
+              <a:t>22/05/2022</a:t>
             </a:fld>
             <a:endParaRPr lang="pt-BR"/>
           </a:p>
@@ -1011,7 +1012,7 @@
           <a:p>
             <a:fld id="{D7EF89F4-677A-454A-B8BB-E8AE75CC721B}" type="datetimeFigureOut">
               <a:rPr lang="pt-BR" smtClean="0"/>
-              <a:t>10/05/2022</a:t>
+              <a:t>22/05/2022</a:t>
             </a:fld>
             <a:endParaRPr lang="pt-BR"/>
           </a:p>
@@ -1243,7 +1244,7 @@
           <a:p>
             <a:fld id="{D7EF89F4-677A-454A-B8BB-E8AE75CC721B}" type="datetimeFigureOut">
               <a:rPr lang="pt-BR" smtClean="0"/>
-              <a:t>10/05/2022</a:t>
+              <a:t>22/05/2022</a:t>
             </a:fld>
             <a:endParaRPr lang="pt-BR"/>
           </a:p>
@@ -1610,7 +1611,7 @@
           <a:p>
             <a:fld id="{D7EF89F4-677A-454A-B8BB-E8AE75CC721B}" type="datetimeFigureOut">
               <a:rPr lang="pt-BR" smtClean="0"/>
-              <a:t>10/05/2022</a:t>
+              <a:t>22/05/2022</a:t>
             </a:fld>
             <a:endParaRPr lang="pt-BR"/>
           </a:p>
@@ -1728,7 +1729,7 @@
           <a:p>
             <a:fld id="{D7EF89F4-677A-454A-B8BB-E8AE75CC721B}" type="datetimeFigureOut">
               <a:rPr lang="pt-BR" smtClean="0"/>
-              <a:t>10/05/2022</a:t>
+              <a:t>22/05/2022</a:t>
             </a:fld>
             <a:endParaRPr lang="pt-BR"/>
           </a:p>
@@ -1823,7 +1824,7 @@
           <a:p>
             <a:fld id="{D7EF89F4-677A-454A-B8BB-E8AE75CC721B}" type="datetimeFigureOut">
               <a:rPr lang="pt-BR" smtClean="0"/>
-              <a:t>10/05/2022</a:t>
+              <a:t>22/05/2022</a:t>
             </a:fld>
             <a:endParaRPr lang="pt-BR"/>
           </a:p>
@@ -2100,7 +2101,7 @@
           <a:p>
             <a:fld id="{D7EF89F4-677A-454A-B8BB-E8AE75CC721B}" type="datetimeFigureOut">
               <a:rPr lang="pt-BR" smtClean="0"/>
-              <a:t>10/05/2022</a:t>
+              <a:t>22/05/2022</a:t>
             </a:fld>
             <a:endParaRPr lang="pt-BR"/>
           </a:p>
@@ -2353,7 +2354,7 @@
           <a:p>
             <a:fld id="{D7EF89F4-677A-454A-B8BB-E8AE75CC721B}" type="datetimeFigureOut">
               <a:rPr lang="pt-BR" smtClean="0"/>
-              <a:t>10/05/2022</a:t>
+              <a:t>22/05/2022</a:t>
             </a:fld>
             <a:endParaRPr lang="pt-BR"/>
           </a:p>
@@ -2566,7 +2567,7 @@
           <a:p>
             <a:fld id="{D7EF89F4-677A-454A-B8BB-E8AE75CC721B}" type="datetimeFigureOut">
               <a:rPr lang="pt-BR" smtClean="0"/>
-              <a:t>10/05/2022</a:t>
+              <a:t>22/05/2022</a:t>
             </a:fld>
             <a:endParaRPr lang="pt-BR"/>
           </a:p>
@@ -4943,6 +4944,255 @@
 </p:sld>
 </file>
 
+<file path=ppt/slides/slide4.xml><?xml version="1.0" encoding="utf-8"?>
+<p:sld xmlns:a="http://schemas.openxmlformats.org/drawingml/2006/main" xmlns:r="http://schemas.openxmlformats.org/officeDocument/2006/relationships" xmlns:p="http://schemas.openxmlformats.org/presentationml/2006/main">
+  <p:cSld>
+    <p:spTree>
+      <p:nvGrpSpPr>
+        <p:cNvPr id="1" name=""/>
+        <p:cNvGrpSpPr/>
+        <p:nvPr/>
+      </p:nvGrpSpPr>
+      <p:grpSpPr>
+        <a:xfrm>
+          <a:off x="0" y="0"/>
+          <a:ext cx="0" cy="0"/>
+          <a:chOff x="0" y="0"/>
+          <a:chExt cx="0" cy="0"/>
+        </a:xfrm>
+      </p:grpSpPr>
+      <p:sp>
+        <p:nvSpPr>
+          <p:cNvPr id="2" name="Retângulo 1"/>
+          <p:cNvSpPr/>
+          <p:nvPr/>
+        </p:nvSpPr>
+        <p:spPr>
+          <a:xfrm>
+            <a:off x="336859" y="796333"/>
+            <a:ext cx="7664141" cy="1169551"/>
+          </a:xfrm>
+          <a:prstGeom prst="rect">
+            <a:avLst/>
+          </a:prstGeom>
+        </p:spPr>
+        <p:txBody>
+          <a:bodyPr wrap="square">
+            <a:spAutoFit/>
+          </a:bodyPr>
+          <a:lstStyle/>
+          <a:p>
+            <a:pPr marL="285750" indent="-285750">
+              <a:buFont typeface="Arial" panose="020B0604020202020204" pitchFamily="34" charset="0"/>
+              <a:buChar char="•"/>
+            </a:pPr>
+            <a:r>
+              <a:rPr lang="pt-BR" sz="1400" b="1" u="sng" dirty="0" smtClean="0">
+                <a:effectLst>
+                  <a:outerShdw blurRad="38100" dist="38100" dir="2700000" algn="tl">
+                    <a:srgbClr val="000000">
+                      <a:alpha val="43137"/>
+                    </a:srgbClr>
+                  </a:outerShdw>
+                </a:effectLst>
+              </a:rPr>
+              <a:t>Criando </a:t>
+            </a:r>
+            <a:r>
+              <a:rPr lang="pt-BR" sz="1400" b="1" u="sng" dirty="0" smtClean="0">
+                <a:effectLst>
+                  <a:outerShdw blurRad="38100" dist="38100" dir="2700000" algn="tl">
+                    <a:srgbClr val="000000">
+                      <a:alpha val="43137"/>
+                    </a:srgbClr>
+                  </a:outerShdw>
+                </a:effectLst>
+              </a:rPr>
+              <a:t>uma </a:t>
+            </a:r>
+            <a:r>
+              <a:rPr lang="pt-BR" sz="1400" b="1" u="sng" dirty="0" err="1" smtClean="0">
+                <a:effectLst>
+                  <a:outerShdw blurRad="38100" dist="38100" dir="2700000" algn="tl">
+                    <a:srgbClr val="000000">
+                      <a:alpha val="43137"/>
+                    </a:srgbClr>
+                  </a:outerShdw>
+                </a:effectLst>
+              </a:rPr>
+              <a:t>branch</a:t>
+            </a:r>
+            <a:endParaRPr lang="pt-BR" sz="1400" b="1" u="sng" dirty="0" smtClean="0">
+              <a:effectLst>
+                <a:outerShdw blurRad="38100" dist="38100" dir="2700000" algn="tl">
+                  <a:srgbClr val="000000">
+                    <a:alpha val="43137"/>
+                  </a:srgbClr>
+                </a:outerShdw>
+              </a:effectLst>
+            </a:endParaRPr>
+          </a:p>
+          <a:p>
+            <a:r>
+              <a:rPr lang="pt-BR" sz="1400" dirty="0" smtClean="0"/>
+              <a:t>Iniciar lista = </a:t>
+            </a:r>
+            <a:r>
+              <a:rPr lang="pt-BR" sz="1400" dirty="0" err="1" smtClean="0"/>
+              <a:t>git</a:t>
+            </a:r>
+            <a:r>
+              <a:rPr lang="pt-BR" sz="1400" dirty="0" smtClean="0"/>
+              <a:t> </a:t>
+            </a:r>
+            <a:r>
+              <a:rPr lang="pt-BR" sz="1400" dirty="0" err="1" smtClean="0"/>
+              <a:t>branch</a:t>
+            </a:r>
+            <a:r>
+              <a:rPr lang="pt-BR" sz="1400" dirty="0" smtClean="0"/>
+              <a:t> lista</a:t>
+            </a:r>
+          </a:p>
+          <a:p>
+            <a:r>
+              <a:rPr lang="pt-BR" sz="1400" dirty="0" smtClean="0"/>
+              <a:t>Mover para ela = </a:t>
+            </a:r>
+            <a:r>
+              <a:rPr lang="pt-BR" sz="1400" dirty="0" err="1" smtClean="0"/>
+              <a:t>git</a:t>
+            </a:r>
+            <a:r>
+              <a:rPr lang="pt-BR" sz="1400" dirty="0" smtClean="0"/>
+              <a:t> </a:t>
+            </a:r>
+            <a:r>
+              <a:rPr lang="pt-BR" sz="1400" dirty="0" err="1" smtClean="0"/>
+              <a:t>checkout</a:t>
+            </a:r>
+            <a:r>
+              <a:rPr lang="pt-BR" sz="1400" dirty="0" smtClean="0"/>
+              <a:t> lista</a:t>
+            </a:r>
+          </a:p>
+          <a:p>
+            <a:r>
+              <a:rPr lang="pt-BR" sz="1400" dirty="0" smtClean="0"/>
+              <a:t>Criar e mover diretamente = </a:t>
+            </a:r>
+            <a:r>
+              <a:rPr lang="pt-BR" sz="1400" dirty="0" err="1" smtClean="0"/>
+              <a:t>git</a:t>
+            </a:r>
+            <a:r>
+              <a:rPr lang="pt-BR" sz="1400" dirty="0" smtClean="0"/>
+              <a:t> </a:t>
+            </a:r>
+            <a:r>
+              <a:rPr lang="pt-BR" sz="1400" dirty="0" err="1" smtClean="0"/>
+              <a:t>checkout</a:t>
+            </a:r>
+            <a:r>
+              <a:rPr lang="pt-BR" sz="1400" dirty="0" smtClean="0"/>
+              <a:t> –b lista </a:t>
+            </a:r>
+          </a:p>
+          <a:p>
+            <a:endParaRPr lang="pt-BR" sz="1400" dirty="0" smtClean="0"/>
+          </a:p>
+        </p:txBody>
+      </p:sp>
+      <p:sp>
+        <p:nvSpPr>
+          <p:cNvPr id="8" name="CaixaDeTexto 7"/>
+          <p:cNvSpPr txBox="1"/>
+          <p:nvPr/>
+        </p:nvSpPr>
+        <p:spPr>
+          <a:xfrm>
+            <a:off x="3257060" y="150002"/>
+            <a:ext cx="8934940" cy="646331"/>
+          </a:xfrm>
+          <a:prstGeom prst="rect">
+            <a:avLst/>
+          </a:prstGeom>
+          <a:noFill/>
+        </p:spPr>
+        <p:txBody>
+          <a:bodyPr wrap="square" rtlCol="0">
+            <a:spAutoFit/>
+          </a:bodyPr>
+          <a:lstStyle/>
+          <a:p>
+            <a:r>
+              <a:rPr lang="pt-BR" sz="3600" dirty="0" smtClean="0">
+                <a:solidFill>
+                  <a:srgbClr val="7030A0"/>
+                </a:solidFill>
+              </a:rPr>
+              <a:t>Criando e gerenciando </a:t>
+            </a:r>
+            <a:r>
+              <a:rPr lang="pt-BR" sz="3600" dirty="0" err="1" smtClean="0">
+                <a:solidFill>
+                  <a:srgbClr val="7030A0"/>
+                </a:solidFill>
+              </a:rPr>
+              <a:t>branches</a:t>
+            </a:r>
+            <a:endParaRPr lang="pt-BR" sz="3600" dirty="0">
+              <a:solidFill>
+                <a:srgbClr val="7030A0"/>
+              </a:solidFill>
+            </a:endParaRPr>
+          </a:p>
+        </p:txBody>
+      </p:sp>
+      <p:pic>
+        <p:nvPicPr>
+          <p:cNvPr id="3" name="Imagem 2"/>
+          <p:cNvPicPr>
+            <a:picLocks noChangeAspect="1"/>
+          </p:cNvPicPr>
+          <p:nvPr/>
+        </p:nvPicPr>
+        <p:blipFill>
+          <a:blip r:embed="rId2"/>
+          <a:stretch>
+            <a:fillRect/>
+          </a:stretch>
+        </p:blipFill>
+        <p:spPr>
+          <a:xfrm>
+            <a:off x="7503459" y="919159"/>
+            <a:ext cx="4243120" cy="1222820"/>
+          </a:xfrm>
+          <a:prstGeom prst="rect">
+            <a:avLst/>
+          </a:prstGeom>
+        </p:spPr>
+      </p:pic>
+    </p:spTree>
+    <p:extLst>
+      <p:ext uri="{BB962C8B-B14F-4D97-AF65-F5344CB8AC3E}">
+        <p14:creationId xmlns:p14="http://schemas.microsoft.com/office/powerpoint/2010/main" val="2450997877"/>
+      </p:ext>
+    </p:extLst>
+  </p:cSld>
+  <p:clrMapOvr>
+    <a:masterClrMapping/>
+  </p:clrMapOvr>
+  <p:timing>
+    <p:tnLst>
+      <p:par>
+        <p:cTn id="1" dur="indefinite" restart="never" nodeType="tmRoot"/>
+      </p:par>
+    </p:tnLst>
+  </p:timing>
+</p:sld>
+</file>
+
 <file path=ppt/theme/theme1.xml><?xml version="1.0" encoding="utf-8"?>
 <a:theme xmlns:a="http://schemas.openxmlformats.org/drawingml/2006/main" name="Tema do Office">
   <a:themeElements>

</xml_diff>